<commit_message>
designing new compound slider
</commit_message>
<xml_diff>
--- a/design/ui_class_diagram.pptx
+++ b/design/ui_class_diagram.pptx
@@ -7,6 +7,7 @@
   <p:sldIdLst>
     <p:sldId id="256" r:id="rId2"/>
     <p:sldId id="257" r:id="rId3"/>
+    <p:sldId id="258" r:id="rId4"/>
   </p:sldIdLst>
   <p:sldSz cx="9144000" cy="6858000" type="screen4x3"/>
   <p:notesSz cx="6858000" cy="9144000"/>
@@ -303,7 +304,7 @@
           <a:p>
             <a:fld id="{4ADE7A81-68AD-7C4F-93EC-91A9EAC43185}" type="datetimeFigureOut">
               <a:rPr lang="en-US" smtClean="0"/>
-              <a:t>11/13/18</a:t>
+              <a:t>12/20/18</a:t>
             </a:fld>
             <a:endParaRPr lang="en-US"/>
           </a:p>
@@ -471,7 +472,7 @@
           <a:p>
             <a:fld id="{4ADE7A81-68AD-7C4F-93EC-91A9EAC43185}" type="datetimeFigureOut">
               <a:rPr lang="en-US" smtClean="0"/>
-              <a:t>11/13/18</a:t>
+              <a:t>12/20/18</a:t>
             </a:fld>
             <a:endParaRPr lang="en-US"/>
           </a:p>
@@ -649,7 +650,7 @@
           <a:p>
             <a:fld id="{4ADE7A81-68AD-7C4F-93EC-91A9EAC43185}" type="datetimeFigureOut">
               <a:rPr lang="en-US" smtClean="0"/>
-              <a:t>11/13/18</a:t>
+              <a:t>12/20/18</a:t>
             </a:fld>
             <a:endParaRPr lang="en-US"/>
           </a:p>
@@ -817,7 +818,7 @@
           <a:p>
             <a:fld id="{4ADE7A81-68AD-7C4F-93EC-91A9EAC43185}" type="datetimeFigureOut">
               <a:rPr lang="en-US" smtClean="0"/>
-              <a:t>11/13/18</a:t>
+              <a:t>12/20/18</a:t>
             </a:fld>
             <a:endParaRPr lang="en-US"/>
           </a:p>
@@ -1062,7 +1063,7 @@
           <a:p>
             <a:fld id="{4ADE7A81-68AD-7C4F-93EC-91A9EAC43185}" type="datetimeFigureOut">
               <a:rPr lang="en-US" smtClean="0"/>
-              <a:t>11/13/18</a:t>
+              <a:t>12/20/18</a:t>
             </a:fld>
             <a:endParaRPr lang="en-US"/>
           </a:p>
@@ -1347,7 +1348,7 @@
           <a:p>
             <a:fld id="{4ADE7A81-68AD-7C4F-93EC-91A9EAC43185}" type="datetimeFigureOut">
               <a:rPr lang="en-US" smtClean="0"/>
-              <a:t>11/13/18</a:t>
+              <a:t>12/20/18</a:t>
             </a:fld>
             <a:endParaRPr lang="en-US"/>
           </a:p>
@@ -1766,7 +1767,7 @@
           <a:p>
             <a:fld id="{4ADE7A81-68AD-7C4F-93EC-91A9EAC43185}" type="datetimeFigureOut">
               <a:rPr lang="en-US" smtClean="0"/>
-              <a:t>11/13/18</a:t>
+              <a:t>12/20/18</a:t>
             </a:fld>
             <a:endParaRPr lang="en-US"/>
           </a:p>
@@ -1883,7 +1884,7 @@
           <a:p>
             <a:fld id="{4ADE7A81-68AD-7C4F-93EC-91A9EAC43185}" type="datetimeFigureOut">
               <a:rPr lang="en-US" smtClean="0"/>
-              <a:t>11/13/18</a:t>
+              <a:t>12/20/18</a:t>
             </a:fld>
             <a:endParaRPr lang="en-US"/>
           </a:p>
@@ -1978,7 +1979,7 @@
           <a:p>
             <a:fld id="{4ADE7A81-68AD-7C4F-93EC-91A9EAC43185}" type="datetimeFigureOut">
               <a:rPr lang="en-US" smtClean="0"/>
-              <a:t>11/13/18</a:t>
+              <a:t>12/20/18</a:t>
             </a:fld>
             <a:endParaRPr lang="en-US"/>
           </a:p>
@@ -2253,7 +2254,7 @@
           <a:p>
             <a:fld id="{4ADE7A81-68AD-7C4F-93EC-91A9EAC43185}" type="datetimeFigureOut">
               <a:rPr lang="en-US" smtClean="0"/>
-              <a:t>11/13/18</a:t>
+              <a:t>12/20/18</a:t>
             </a:fld>
             <a:endParaRPr lang="en-US"/>
           </a:p>
@@ -2505,7 +2506,7 @@
           <a:p>
             <a:fld id="{4ADE7A81-68AD-7C4F-93EC-91A9EAC43185}" type="datetimeFigureOut">
               <a:rPr lang="en-US" smtClean="0"/>
-              <a:t>11/13/18</a:t>
+              <a:t>12/20/18</a:t>
             </a:fld>
             <a:endParaRPr lang="en-US"/>
           </a:p>
@@ -2716,7 +2717,7 @@
           <a:p>
             <a:fld id="{4ADE7A81-68AD-7C4F-93EC-91A9EAC43185}" type="datetimeFigureOut">
               <a:rPr lang="en-US" smtClean="0"/>
-              <a:t>11/13/18</a:t>
+              <a:t>12/20/18</a:t>
             </a:fld>
             <a:endParaRPr lang="en-US"/>
           </a:p>
@@ -4125,6 +4126,808 @@
     <p:extLst>
       <p:ext uri="{BB962C8B-B14F-4D97-AF65-F5344CB8AC3E}">
         <p14:creationId xmlns:p14="http://schemas.microsoft.com/office/powerpoint/2010/main" val="677395286"/>
+      </p:ext>
+    </p:extLst>
+  </p:cSld>
+  <p:clrMapOvr>
+    <a:masterClrMapping/>
+  </p:clrMapOvr>
+</p:sld>
+</file>
+
+<file path=ppt/slides/slide3.xml><?xml version="1.0" encoding="utf-8"?>
+<p:sld xmlns:a="http://schemas.openxmlformats.org/drawingml/2006/main" xmlns:r="http://schemas.openxmlformats.org/officeDocument/2006/relationships" xmlns:p="http://schemas.openxmlformats.org/presentationml/2006/main">
+  <p:cSld>
+    <p:spTree>
+      <p:nvGrpSpPr>
+        <p:cNvPr id="1" name=""/>
+        <p:cNvGrpSpPr/>
+        <p:nvPr/>
+      </p:nvGrpSpPr>
+      <p:grpSpPr>
+        <a:xfrm>
+          <a:off x="0" y="0"/>
+          <a:ext cx="0" cy="0"/>
+          <a:chOff x="0" y="0"/>
+          <a:chExt cx="0" cy="0"/>
+        </a:xfrm>
+      </p:grpSpPr>
+      <p:sp>
+        <p:nvSpPr>
+          <p:cNvPr id="18" name="Rectangle 17">
+            <a:extLst>
+              <a:ext uri="{FF2B5EF4-FFF2-40B4-BE49-F238E27FC236}">
+                <a16:creationId xmlns:a16="http://schemas.microsoft.com/office/drawing/2014/main" id="{9667A8CC-37A4-D241-9A4A-3A8B3DB8E169}"/>
+              </a:ext>
+            </a:extLst>
+          </p:cNvPr>
+          <p:cNvSpPr/>
+          <p:nvPr/>
+        </p:nvSpPr>
+        <p:spPr>
+          <a:xfrm>
+            <a:off x="949610" y="987181"/>
+            <a:ext cx="7602203" cy="2881293"/>
+          </a:xfrm>
+          <a:prstGeom prst="rect">
+            <a:avLst/>
+          </a:prstGeom>
+        </p:spPr>
+        <p:style>
+          <a:lnRef idx="1">
+            <a:schemeClr val="accent1"/>
+          </a:lnRef>
+          <a:fillRef idx="3">
+            <a:schemeClr val="accent1"/>
+          </a:fillRef>
+          <a:effectRef idx="2">
+            <a:schemeClr val="accent1"/>
+          </a:effectRef>
+          <a:fontRef idx="minor">
+            <a:schemeClr val="lt1"/>
+          </a:fontRef>
+        </p:style>
+        <p:txBody>
+          <a:bodyPr rtlCol="0" anchor="t" anchorCtr="0"/>
+          <a:lstStyle/>
+          <a:p>
+            <a:pPr algn="ctr"/>
+            <a:r>
+              <a:rPr lang="en-US" dirty="0" err="1">
+                <a:solidFill>
+                  <a:schemeClr val="tx1"/>
+                </a:solidFill>
+                <a:latin typeface="Courier"/>
+                <a:cs typeface="Courier"/>
+              </a:rPr>
+              <a:t>CinCompoundSlider</a:t>
+            </a:r>
+            <a:endParaRPr lang="en-US" dirty="0">
+              <a:solidFill>
+                <a:schemeClr val="tx1"/>
+              </a:solidFill>
+              <a:latin typeface="Courier"/>
+              <a:cs typeface="Courier"/>
+            </a:endParaRPr>
+          </a:p>
+        </p:txBody>
+      </p:sp>
+      <p:sp>
+        <p:nvSpPr>
+          <p:cNvPr id="10" name="Rectangle 9"/>
+          <p:cNvSpPr/>
+          <p:nvPr/>
+        </p:nvSpPr>
+        <p:spPr>
+          <a:xfrm>
+            <a:off x="1430761" y="1801444"/>
+            <a:ext cx="1556279" cy="697928"/>
+          </a:xfrm>
+          <a:prstGeom prst="rect">
+            <a:avLst/>
+          </a:prstGeom>
+        </p:spPr>
+        <p:style>
+          <a:lnRef idx="1">
+            <a:schemeClr val="accent1"/>
+          </a:lnRef>
+          <a:fillRef idx="3">
+            <a:schemeClr val="accent1"/>
+          </a:fillRef>
+          <a:effectRef idx="2">
+            <a:schemeClr val="accent1"/>
+          </a:effectRef>
+          <a:fontRef idx="minor">
+            <a:schemeClr val="lt1"/>
+          </a:fontRef>
+        </p:style>
+        <p:txBody>
+          <a:bodyPr rtlCol="0" anchor="t" anchorCtr="0"/>
+          <a:lstStyle/>
+          <a:p>
+            <a:pPr algn="ctr"/>
+            <a:r>
+              <a:rPr lang="en-US" dirty="0" err="1">
+                <a:solidFill>
+                  <a:schemeClr val="tx1"/>
+                </a:solidFill>
+                <a:latin typeface="Courier"/>
+                <a:cs typeface="Courier"/>
+              </a:rPr>
+              <a:t>mLabel</a:t>
+            </a:r>
+            <a:endParaRPr lang="en-US" dirty="0">
+              <a:solidFill>
+                <a:schemeClr val="tx1"/>
+              </a:solidFill>
+              <a:latin typeface="Courier"/>
+              <a:cs typeface="Courier"/>
+            </a:endParaRPr>
+          </a:p>
+          <a:p>
+            <a:pPr algn="ctr"/>
+            <a:r>
+              <a:rPr lang="en-US" dirty="0">
+                <a:solidFill>
+                  <a:schemeClr val="tx1"/>
+                </a:solidFill>
+                <a:latin typeface="Courier"/>
+                <a:cs typeface="Courier"/>
+              </a:rPr>
+              <a:t>(</a:t>
+            </a:r>
+            <a:r>
+              <a:rPr lang="en-US" dirty="0" err="1">
+                <a:solidFill>
+                  <a:schemeClr val="tx1"/>
+                </a:solidFill>
+                <a:latin typeface="Courier"/>
+                <a:cs typeface="Courier"/>
+              </a:rPr>
+              <a:t>QLabel</a:t>
+            </a:r>
+            <a:r>
+              <a:rPr lang="en-US" dirty="0">
+                <a:solidFill>
+                  <a:schemeClr val="tx1"/>
+                </a:solidFill>
+                <a:latin typeface="Courier"/>
+                <a:cs typeface="Courier"/>
+              </a:rPr>
+              <a:t>)</a:t>
+            </a:r>
+          </a:p>
+        </p:txBody>
+      </p:sp>
+      <p:sp>
+        <p:nvSpPr>
+          <p:cNvPr id="14" name="Rectangle 13">
+            <a:extLst>
+              <a:ext uri="{FF2B5EF4-FFF2-40B4-BE49-F238E27FC236}">
+                <a16:creationId xmlns:a16="http://schemas.microsoft.com/office/drawing/2014/main" id="{9DC502BB-2759-5647-8343-CFE8A1C1A556}"/>
+              </a:ext>
+            </a:extLst>
+          </p:cNvPr>
+          <p:cNvSpPr/>
+          <p:nvPr/>
+        </p:nvSpPr>
+        <p:spPr>
+          <a:xfrm>
+            <a:off x="3159412" y="1801443"/>
+            <a:ext cx="2518577" cy="1864866"/>
+          </a:xfrm>
+          <a:prstGeom prst="rect">
+            <a:avLst/>
+          </a:prstGeom>
+        </p:spPr>
+        <p:style>
+          <a:lnRef idx="1">
+            <a:schemeClr val="accent1"/>
+          </a:lnRef>
+          <a:fillRef idx="3">
+            <a:schemeClr val="accent1"/>
+          </a:fillRef>
+          <a:effectRef idx="2">
+            <a:schemeClr val="accent1"/>
+          </a:effectRef>
+          <a:fontRef idx="minor">
+            <a:schemeClr val="lt1"/>
+          </a:fontRef>
+        </p:style>
+        <p:txBody>
+          <a:bodyPr rtlCol="0" anchor="t" anchorCtr="0"/>
+          <a:lstStyle/>
+          <a:p>
+            <a:pPr algn="ctr"/>
+            <a:r>
+              <a:rPr lang="en-US" dirty="0" err="1">
+                <a:solidFill>
+                  <a:schemeClr val="tx1"/>
+                </a:solidFill>
+                <a:latin typeface="Courier"/>
+                <a:cs typeface="Courier"/>
+              </a:rPr>
+              <a:t>mSlider</a:t>
+            </a:r>
+            <a:endParaRPr lang="en-US" dirty="0">
+              <a:solidFill>
+                <a:schemeClr val="tx1"/>
+              </a:solidFill>
+              <a:latin typeface="Courier"/>
+              <a:cs typeface="Courier"/>
+            </a:endParaRPr>
+          </a:p>
+          <a:p>
+            <a:pPr algn="ctr"/>
+            <a:r>
+              <a:rPr lang="en-US" dirty="0">
+                <a:solidFill>
+                  <a:schemeClr val="tx1"/>
+                </a:solidFill>
+                <a:latin typeface="Courier"/>
+                <a:cs typeface="Courier"/>
+              </a:rPr>
+              <a:t>(</a:t>
+            </a:r>
+            <a:r>
+              <a:rPr lang="en-US" dirty="0" err="1">
+                <a:solidFill>
+                  <a:schemeClr val="tx1"/>
+                </a:solidFill>
+                <a:latin typeface="Courier"/>
+                <a:cs typeface="Courier"/>
+              </a:rPr>
+              <a:t>QSlider</a:t>
+            </a:r>
+            <a:r>
+              <a:rPr lang="en-US" dirty="0">
+                <a:solidFill>
+                  <a:schemeClr val="tx1"/>
+                </a:solidFill>
+                <a:latin typeface="Courier"/>
+                <a:cs typeface="Courier"/>
+              </a:rPr>
+              <a:t>)</a:t>
+            </a:r>
+          </a:p>
+        </p:txBody>
+      </p:sp>
+      <p:sp>
+        <p:nvSpPr>
+          <p:cNvPr id="16" name="Rectangle 15">
+            <a:extLst>
+              <a:ext uri="{FF2B5EF4-FFF2-40B4-BE49-F238E27FC236}">
+                <a16:creationId xmlns:a16="http://schemas.microsoft.com/office/drawing/2014/main" id="{D54DF4E2-B3F0-224E-8201-014CCD021563}"/>
+              </a:ext>
+            </a:extLst>
+          </p:cNvPr>
+          <p:cNvSpPr/>
+          <p:nvPr/>
+        </p:nvSpPr>
+        <p:spPr>
+          <a:xfrm>
+            <a:off x="5841652" y="1801444"/>
+            <a:ext cx="1556279" cy="697928"/>
+          </a:xfrm>
+          <a:prstGeom prst="rect">
+            <a:avLst/>
+          </a:prstGeom>
+        </p:spPr>
+        <p:style>
+          <a:lnRef idx="1">
+            <a:schemeClr val="accent1"/>
+          </a:lnRef>
+          <a:fillRef idx="3">
+            <a:schemeClr val="accent1"/>
+          </a:fillRef>
+          <a:effectRef idx="2">
+            <a:schemeClr val="accent1"/>
+          </a:effectRef>
+          <a:fontRef idx="minor">
+            <a:schemeClr val="lt1"/>
+          </a:fontRef>
+        </p:style>
+        <p:txBody>
+          <a:bodyPr rtlCol="0" anchor="t" anchorCtr="0"/>
+          <a:lstStyle/>
+          <a:p>
+            <a:pPr algn="ctr"/>
+            <a:r>
+              <a:rPr lang="en-US" dirty="0" err="1">
+                <a:solidFill>
+                  <a:schemeClr val="tx1"/>
+                </a:solidFill>
+                <a:latin typeface="Courier"/>
+                <a:cs typeface="Courier"/>
+              </a:rPr>
+              <a:t>mValue</a:t>
+            </a:r>
+            <a:endParaRPr lang="en-US" dirty="0">
+              <a:solidFill>
+                <a:schemeClr val="tx1"/>
+              </a:solidFill>
+              <a:latin typeface="Courier"/>
+              <a:cs typeface="Courier"/>
+            </a:endParaRPr>
+          </a:p>
+          <a:p>
+            <a:pPr algn="ctr"/>
+            <a:r>
+              <a:rPr lang="en-US" dirty="0">
+                <a:solidFill>
+                  <a:schemeClr val="tx1"/>
+                </a:solidFill>
+                <a:latin typeface="Courier"/>
+                <a:cs typeface="Courier"/>
+              </a:rPr>
+              <a:t>(</a:t>
+            </a:r>
+            <a:r>
+              <a:rPr lang="en-US" dirty="0" err="1">
+                <a:solidFill>
+                  <a:schemeClr val="tx1"/>
+                </a:solidFill>
+                <a:latin typeface="Courier"/>
+                <a:cs typeface="Courier"/>
+              </a:rPr>
+              <a:t>QLabel</a:t>
+            </a:r>
+            <a:r>
+              <a:rPr lang="en-US" dirty="0">
+                <a:solidFill>
+                  <a:schemeClr val="tx1"/>
+                </a:solidFill>
+                <a:latin typeface="Courier"/>
+                <a:cs typeface="Courier"/>
+              </a:rPr>
+              <a:t>)</a:t>
+            </a:r>
+          </a:p>
+        </p:txBody>
+      </p:sp>
+      <p:sp>
+        <p:nvSpPr>
+          <p:cNvPr id="23" name="Rectangle 22">
+            <a:extLst>
+              <a:ext uri="{FF2B5EF4-FFF2-40B4-BE49-F238E27FC236}">
+                <a16:creationId xmlns:a16="http://schemas.microsoft.com/office/drawing/2014/main" id="{73CD8530-6881-804F-9FED-7AB428CBDF3D}"/>
+              </a:ext>
+            </a:extLst>
+          </p:cNvPr>
+          <p:cNvSpPr/>
+          <p:nvPr/>
+        </p:nvSpPr>
+        <p:spPr>
+          <a:xfrm>
+            <a:off x="949610" y="4249913"/>
+            <a:ext cx="2472082" cy="1149401"/>
+          </a:xfrm>
+          <a:prstGeom prst="rect">
+            <a:avLst/>
+          </a:prstGeom>
+        </p:spPr>
+        <p:style>
+          <a:lnRef idx="1">
+            <a:schemeClr val="accent1"/>
+          </a:lnRef>
+          <a:fillRef idx="3">
+            <a:schemeClr val="accent1"/>
+          </a:fillRef>
+          <a:effectRef idx="2">
+            <a:schemeClr val="accent1"/>
+          </a:effectRef>
+          <a:fontRef idx="minor">
+            <a:schemeClr val="lt1"/>
+          </a:fontRef>
+        </p:style>
+        <p:txBody>
+          <a:bodyPr rtlCol="0" anchor="t" anchorCtr="0"/>
+          <a:lstStyle/>
+          <a:p>
+            <a:pPr algn="ctr"/>
+            <a:r>
+              <a:rPr lang="en-US" dirty="0" err="1">
+                <a:solidFill>
+                  <a:schemeClr val="tx1"/>
+                </a:solidFill>
+                <a:latin typeface="Courier"/>
+                <a:cs typeface="Courier"/>
+              </a:rPr>
+              <a:t>CinParameter</a:t>
+            </a:r>
+            <a:endParaRPr lang="en-US" dirty="0">
+              <a:solidFill>
+                <a:schemeClr val="tx1"/>
+              </a:solidFill>
+              <a:latin typeface="Courier"/>
+              <a:cs typeface="Courier"/>
+            </a:endParaRPr>
+          </a:p>
+        </p:txBody>
+      </p:sp>
+      <p:sp>
+        <p:nvSpPr>
+          <p:cNvPr id="2" name="TextBox 1">
+            <a:extLst>
+              <a:ext uri="{FF2B5EF4-FFF2-40B4-BE49-F238E27FC236}">
+                <a16:creationId xmlns:a16="http://schemas.microsoft.com/office/drawing/2014/main" id="{1F208B91-DC6E-3648-A8C8-68D8459CC971}"/>
+              </a:ext>
+            </a:extLst>
+          </p:cNvPr>
+          <p:cNvSpPr txBox="1"/>
+          <p:nvPr/>
+        </p:nvSpPr>
+        <p:spPr>
+          <a:xfrm>
+            <a:off x="1643351" y="2906923"/>
+            <a:ext cx="1038105" cy="276999"/>
+          </a:xfrm>
+          <a:prstGeom prst="rect">
+            <a:avLst/>
+          </a:prstGeom>
+          <a:noFill/>
+        </p:spPr>
+        <p:txBody>
+          <a:bodyPr wrap="none" rtlCol="0">
+            <a:spAutoFit/>
+          </a:bodyPr>
+          <a:lstStyle/>
+          <a:p>
+            <a:r>
+              <a:rPr lang="en-US" sz="1200" dirty="0"/>
+              <a:t>*</a:t>
+            </a:r>
+            <a:r>
+              <a:rPr lang="en-US" sz="1200" dirty="0" err="1"/>
+              <a:t>mParameter</a:t>
+            </a:r>
+            <a:endParaRPr lang="en-US" sz="1200" dirty="0"/>
+          </a:p>
+        </p:txBody>
+      </p:sp>
+      <p:cxnSp>
+        <p:nvCxnSpPr>
+          <p:cNvPr id="7" name="Straight Arrow Connector 6">
+            <a:extLst>
+              <a:ext uri="{FF2B5EF4-FFF2-40B4-BE49-F238E27FC236}">
+                <a16:creationId xmlns:a16="http://schemas.microsoft.com/office/drawing/2014/main" id="{9374EE1B-F3E4-9A4D-9563-2836FFF29393}"/>
+              </a:ext>
+            </a:extLst>
+          </p:cNvPr>
+          <p:cNvCxnSpPr>
+            <a:cxnSpLocks/>
+            <a:stCxn id="2" idx="2"/>
+            <a:endCxn id="23" idx="0"/>
+          </p:cNvCxnSpPr>
+          <p:nvPr/>
+        </p:nvCxnSpPr>
+        <p:spPr>
+          <a:xfrm>
+            <a:off x="2162404" y="3183922"/>
+            <a:ext cx="23247" cy="1065991"/>
+          </a:xfrm>
+          <a:prstGeom prst="straightConnector1">
+            <a:avLst/>
+          </a:prstGeom>
+          <a:ln>
+            <a:solidFill>
+              <a:schemeClr val="tx1"/>
+            </a:solidFill>
+            <a:tailEnd type="triangle"/>
+          </a:ln>
+        </p:spPr>
+        <p:style>
+          <a:lnRef idx="2">
+            <a:schemeClr val="accent1"/>
+          </a:lnRef>
+          <a:fillRef idx="0">
+            <a:schemeClr val="accent1"/>
+          </a:fillRef>
+          <a:effectRef idx="1">
+            <a:schemeClr val="accent1"/>
+          </a:effectRef>
+          <a:fontRef idx="minor">
+            <a:schemeClr val="tx1"/>
+          </a:fontRef>
+        </p:style>
+      </p:cxnSp>
+      <p:cxnSp>
+        <p:nvCxnSpPr>
+          <p:cNvPr id="43" name="Straight Arrow Connector 42">
+            <a:extLst>
+              <a:ext uri="{FF2B5EF4-FFF2-40B4-BE49-F238E27FC236}">
+                <a16:creationId xmlns:a16="http://schemas.microsoft.com/office/drawing/2014/main" id="{C936F10E-71AC-D047-B07C-F99944085CA7}"/>
+              </a:ext>
+            </a:extLst>
+          </p:cNvPr>
+          <p:cNvCxnSpPr>
+            <a:cxnSpLocks/>
+            <a:stCxn id="50" idx="3"/>
+          </p:cNvCxnSpPr>
+          <p:nvPr/>
+        </p:nvCxnSpPr>
+        <p:spPr>
+          <a:xfrm>
+            <a:off x="5441484" y="3126871"/>
+            <a:ext cx="400168" cy="0"/>
+          </a:xfrm>
+          <a:prstGeom prst="straightConnector1">
+            <a:avLst/>
+          </a:prstGeom>
+          <a:ln>
+            <a:solidFill>
+              <a:schemeClr val="accent3">
+                <a:lumMod val="75000"/>
+              </a:schemeClr>
+            </a:solidFill>
+            <a:tailEnd type="triangle"/>
+          </a:ln>
+        </p:spPr>
+        <p:style>
+          <a:lnRef idx="2">
+            <a:schemeClr val="accent1"/>
+          </a:lnRef>
+          <a:fillRef idx="0">
+            <a:schemeClr val="accent1"/>
+          </a:fillRef>
+          <a:effectRef idx="1">
+            <a:schemeClr val="accent1"/>
+          </a:effectRef>
+          <a:fontRef idx="minor">
+            <a:schemeClr val="tx1"/>
+          </a:fontRef>
+        </p:style>
+      </p:cxnSp>
+      <p:sp>
+        <p:nvSpPr>
+          <p:cNvPr id="49" name="TextBox 48">
+            <a:extLst>
+              <a:ext uri="{FF2B5EF4-FFF2-40B4-BE49-F238E27FC236}">
+                <a16:creationId xmlns:a16="http://schemas.microsoft.com/office/drawing/2014/main" id="{80371580-242A-A44F-AFA6-399DFFC30638}"/>
+              </a:ext>
+            </a:extLst>
+          </p:cNvPr>
+          <p:cNvSpPr txBox="1"/>
+          <p:nvPr/>
+        </p:nvSpPr>
+        <p:spPr>
+          <a:xfrm>
+            <a:off x="5814344" y="3005808"/>
+            <a:ext cx="2320764" cy="830997"/>
+          </a:xfrm>
+          <a:prstGeom prst="rect">
+            <a:avLst/>
+          </a:prstGeom>
+          <a:noFill/>
+        </p:spPr>
+        <p:txBody>
+          <a:bodyPr wrap="none" rtlCol="0">
+            <a:spAutoFit/>
+          </a:bodyPr>
+          <a:lstStyle/>
+          <a:p>
+            <a:r>
+              <a:rPr lang="en-US" sz="1200" dirty="0"/>
+              <a:t>SLOT </a:t>
+            </a:r>
+            <a:r>
+              <a:rPr lang="en-US" sz="1200" dirty="0" err="1"/>
+              <a:t>onSliderValueChanged</a:t>
+            </a:r>
+            <a:r>
+              <a:rPr lang="en-US" sz="1200" dirty="0"/>
+              <a:t>()</a:t>
+            </a:r>
+          </a:p>
+          <a:p>
+            <a:endParaRPr lang="en-US" sz="1200" dirty="0"/>
+          </a:p>
+          <a:p>
+            <a:r>
+              <a:rPr lang="en-US" sz="1200" dirty="0"/>
+              <a:t>SLOT </a:t>
+            </a:r>
+            <a:r>
+              <a:rPr lang="en-US" sz="1200" dirty="0" err="1"/>
+              <a:t>onParameterValueChanged</a:t>
+            </a:r>
+            <a:r>
+              <a:rPr lang="en-US" sz="1200" dirty="0"/>
+              <a:t>()</a:t>
+            </a:r>
+          </a:p>
+          <a:p>
+            <a:endParaRPr lang="en-US" sz="1200" dirty="0"/>
+          </a:p>
+        </p:txBody>
+      </p:sp>
+      <p:sp>
+        <p:nvSpPr>
+          <p:cNvPr id="50" name="Rounded Rectangle 49">
+            <a:extLst>
+              <a:ext uri="{FF2B5EF4-FFF2-40B4-BE49-F238E27FC236}">
+                <a16:creationId xmlns:a16="http://schemas.microsoft.com/office/drawing/2014/main" id="{F946899D-DC3B-F141-B22E-34CC6AC972AD}"/>
+              </a:ext>
+            </a:extLst>
+          </p:cNvPr>
+          <p:cNvSpPr/>
+          <p:nvPr/>
+        </p:nvSpPr>
+        <p:spPr>
+          <a:xfrm>
+            <a:off x="3355864" y="2903714"/>
+            <a:ext cx="2085620" cy="446314"/>
+          </a:xfrm>
+          <a:prstGeom prst="roundRect">
+            <a:avLst/>
+          </a:prstGeom>
+          <a:solidFill>
+            <a:schemeClr val="accent3">
+              <a:lumMod val="75000"/>
+            </a:schemeClr>
+          </a:solidFill>
+          <a:ln>
+            <a:solidFill>
+              <a:schemeClr val="tx1"/>
+            </a:solidFill>
+          </a:ln>
+        </p:spPr>
+        <p:style>
+          <a:lnRef idx="1">
+            <a:schemeClr val="accent1"/>
+          </a:lnRef>
+          <a:fillRef idx="3">
+            <a:schemeClr val="accent1"/>
+          </a:fillRef>
+          <a:effectRef idx="2">
+            <a:schemeClr val="accent1"/>
+          </a:effectRef>
+          <a:fontRef idx="minor">
+            <a:schemeClr val="lt1"/>
+          </a:fontRef>
+        </p:style>
+        <p:txBody>
+          <a:bodyPr rtlCol="0" anchor="ctr"/>
+          <a:lstStyle/>
+          <a:p>
+            <a:pPr algn="ctr"/>
+            <a:r>
+              <a:rPr lang="en-US" dirty="0" err="1">
+                <a:solidFill>
+                  <a:schemeClr val="tx1"/>
+                </a:solidFill>
+                <a:latin typeface="Courier" pitchFamily="2" charset="0"/>
+              </a:rPr>
+              <a:t>valueChanged</a:t>
+            </a:r>
+            <a:endParaRPr lang="en-US" dirty="0">
+              <a:solidFill>
+                <a:schemeClr val="tx1"/>
+              </a:solidFill>
+              <a:latin typeface="Courier" pitchFamily="2" charset="0"/>
+            </a:endParaRPr>
+          </a:p>
+        </p:txBody>
+      </p:sp>
+      <p:sp>
+        <p:nvSpPr>
+          <p:cNvPr id="51" name="Rounded Rectangle 50">
+            <a:extLst>
+              <a:ext uri="{FF2B5EF4-FFF2-40B4-BE49-F238E27FC236}">
+                <a16:creationId xmlns:a16="http://schemas.microsoft.com/office/drawing/2014/main" id="{57EF7789-0279-A14C-986B-E674E7BFAB0D}"/>
+              </a:ext>
+            </a:extLst>
+          </p:cNvPr>
+          <p:cNvSpPr/>
+          <p:nvPr/>
+        </p:nvSpPr>
+        <p:spPr>
+          <a:xfrm>
+            <a:off x="1119594" y="4701642"/>
+            <a:ext cx="2085620" cy="446314"/>
+          </a:xfrm>
+          <a:prstGeom prst="roundRect">
+            <a:avLst/>
+          </a:prstGeom>
+          <a:solidFill>
+            <a:schemeClr val="accent3">
+              <a:lumMod val="75000"/>
+            </a:schemeClr>
+          </a:solidFill>
+          <a:ln>
+            <a:solidFill>
+              <a:schemeClr val="tx1"/>
+            </a:solidFill>
+          </a:ln>
+        </p:spPr>
+        <p:style>
+          <a:lnRef idx="1">
+            <a:schemeClr val="accent1"/>
+          </a:lnRef>
+          <a:fillRef idx="3">
+            <a:schemeClr val="accent1"/>
+          </a:fillRef>
+          <a:effectRef idx="2">
+            <a:schemeClr val="accent1"/>
+          </a:effectRef>
+          <a:fontRef idx="minor">
+            <a:schemeClr val="lt1"/>
+          </a:fontRef>
+        </p:style>
+        <p:txBody>
+          <a:bodyPr rtlCol="0" anchor="ctr"/>
+          <a:lstStyle/>
+          <a:p>
+            <a:pPr algn="ctr"/>
+            <a:r>
+              <a:rPr lang="en-US" dirty="0" err="1">
+                <a:solidFill>
+                  <a:schemeClr val="tx1"/>
+                </a:solidFill>
+                <a:latin typeface="Courier" pitchFamily="2" charset="0"/>
+              </a:rPr>
+              <a:t>valueChanged</a:t>
+            </a:r>
+            <a:endParaRPr lang="en-US" dirty="0">
+              <a:solidFill>
+                <a:schemeClr val="tx1"/>
+              </a:solidFill>
+              <a:latin typeface="Courier" pitchFamily="2" charset="0"/>
+            </a:endParaRPr>
+          </a:p>
+        </p:txBody>
+      </p:sp>
+      <p:cxnSp>
+        <p:nvCxnSpPr>
+          <p:cNvPr id="57" name="Straight Arrow Connector 56">
+            <a:extLst>
+              <a:ext uri="{FF2B5EF4-FFF2-40B4-BE49-F238E27FC236}">
+                <a16:creationId xmlns:a16="http://schemas.microsoft.com/office/drawing/2014/main" id="{7BE628FB-3ADB-DC44-94BA-FDF0F2EA417F}"/>
+              </a:ext>
+            </a:extLst>
+          </p:cNvPr>
+          <p:cNvCxnSpPr>
+            <a:cxnSpLocks/>
+            <a:stCxn id="51" idx="3"/>
+          </p:cNvCxnSpPr>
+          <p:nvPr/>
+        </p:nvCxnSpPr>
+        <p:spPr>
+          <a:xfrm flipV="1">
+            <a:off x="3205214" y="3526970"/>
+            <a:ext cx="2636438" cy="1397829"/>
+          </a:xfrm>
+          <a:prstGeom prst="straightConnector1">
+            <a:avLst/>
+          </a:prstGeom>
+          <a:ln>
+            <a:solidFill>
+              <a:schemeClr val="accent3">
+                <a:lumMod val="75000"/>
+              </a:schemeClr>
+            </a:solidFill>
+            <a:tailEnd type="triangle"/>
+          </a:ln>
+        </p:spPr>
+        <p:style>
+          <a:lnRef idx="2">
+            <a:schemeClr val="accent1"/>
+          </a:lnRef>
+          <a:fillRef idx="0">
+            <a:schemeClr val="accent1"/>
+          </a:fillRef>
+          <a:effectRef idx="1">
+            <a:schemeClr val="accent1"/>
+          </a:effectRef>
+          <a:fontRef idx="minor">
+            <a:schemeClr val="tx1"/>
+          </a:fontRef>
+        </p:style>
+      </p:cxnSp>
+    </p:spTree>
+    <p:extLst>
+      <p:ext uri="{BB962C8B-B14F-4D97-AF65-F5344CB8AC3E}">
+        <p14:creationId xmlns:p14="http://schemas.microsoft.com/office/powerpoint/2010/main" val="2217324575"/>
       </p:ext>
     </p:extLst>
   </p:cSld>

</xml_diff>